<commit_message>
PAP für AES überarbeitet
</commit_message>
<xml_diff>
--- a/Kryptographie-Praesentation.pptx
+++ b/Kryptographie-Praesentation.pptx
@@ -639,8 +639,8 @@
         </p:nvSpPr>
         <p:spPr>
           <a:xfrm>
-            <a:off x="381187" y="685800"/>
-            <a:ext cx="6096299" cy="3429000"/>
+            <a:off x="381000" y="685800"/>
+            <a:ext cx="6096000" cy="3429000"/>
           </a:xfrm>
           <a:custGeom>
             <a:avLst/>
@@ -2859,8 +2859,8 @@
         </p:nvSpPr>
         <p:spPr>
           <a:xfrm>
-            <a:off x="381187" y="685800"/>
-            <a:ext cx="6096299" cy="3429000"/>
+            <a:off x="381000" y="685800"/>
+            <a:ext cx="6096000" cy="3429000"/>
           </a:xfrm>
           <a:custGeom>
             <a:avLst/>
@@ -6675,30 +6675,26 @@
       </p:graphicFrame>
       <p:pic>
         <p:nvPicPr>
-          <p:cNvPr id="150" name="Shape 150"/>
-          <p:cNvPicPr preferRelativeResize="0"/>
+          <p:cNvPr id="7" name="Grafik 6" descr="AES.png"/>
+          <p:cNvPicPr>
+            <a:picLocks noChangeAspect="1"/>
+          </p:cNvPicPr>
           <p:nvPr/>
         </p:nvPicPr>
         <p:blipFill>
-          <a:blip r:embed="rId3">
-            <a:alphaModFix/>
-          </a:blip>
+          <a:blip r:embed="rId3"/>
           <a:stretch>
             <a:fillRect/>
           </a:stretch>
         </p:blipFill>
         <p:spPr>
           <a:xfrm>
-            <a:off x="396937" y="1153673"/>
-            <a:ext cx="2657475" cy="3989824"/>
+            <a:off x="179512" y="1203598"/>
+            <a:ext cx="2609777" cy="3939902"/>
           </a:xfrm>
           <a:prstGeom prst="rect">
             <a:avLst/>
           </a:prstGeom>
-          <a:noFill/>
-          <a:ln>
-            <a:noFill/>
-          </a:ln>
         </p:spPr>
       </p:pic>
     </p:spTree>
@@ -21364,30 +21360,26 @@
       </p:sp>
       <p:pic>
         <p:nvPicPr>
-          <p:cNvPr id="77" name="Shape 77"/>
-          <p:cNvPicPr preferRelativeResize="0"/>
+          <p:cNvPr id="4" name="Grafik 3" descr="AES.png"/>
+          <p:cNvPicPr>
+            <a:picLocks noChangeAspect="1"/>
+          </p:cNvPicPr>
           <p:nvPr/>
         </p:nvPicPr>
         <p:blipFill>
-          <a:blip r:embed="rId3">
-            <a:alphaModFix/>
-          </a:blip>
+          <a:blip r:embed="rId3"/>
           <a:stretch>
             <a:fillRect/>
           </a:stretch>
         </p:blipFill>
         <p:spPr>
           <a:xfrm>
-            <a:off x="3243262" y="1153673"/>
-            <a:ext cx="2657475" cy="3989824"/>
+            <a:off x="3059832" y="1203598"/>
+            <a:ext cx="2609777" cy="3939902"/>
           </a:xfrm>
           <a:prstGeom prst="rect">
             <a:avLst/>
           </a:prstGeom>
-          <a:noFill/>
-          <a:ln>
-            <a:noFill/>
-          </a:ln>
         </p:spPr>
       </p:pic>
     </p:spTree>

</xml_diff>